<commit_message>
update with flask and io integration
</commit_message>
<xml_diff>
--- a/Documentation.pptx
+++ b/Documentation.pptx
@@ -3377,7 +3377,7 @@
         </p:nvSpPr>
         <p:spPr>
           <a:xfrm>
-            <a:off x="2244436" y="1177636"/>
+            <a:off x="304800" y="1140690"/>
             <a:ext cx="1985818" cy="692727"/>
           </a:xfrm>
           <a:prstGeom prst="rect">
@@ -3426,7 +3426,7 @@
         </p:nvSpPr>
         <p:spPr>
           <a:xfrm>
-            <a:off x="175490" y="2479962"/>
+            <a:off x="1149990" y="2690089"/>
             <a:ext cx="1985818" cy="692727"/>
           </a:xfrm>
           <a:prstGeom prst="rect">
@@ -3475,7 +3475,7 @@
         </p:nvSpPr>
         <p:spPr>
           <a:xfrm>
-            <a:off x="2244436" y="3796146"/>
+            <a:off x="2346067" y="4604903"/>
             <a:ext cx="1985818" cy="692727"/>
           </a:xfrm>
           <a:prstGeom prst="rect">
@@ -3524,7 +3524,7 @@
         </p:nvSpPr>
         <p:spPr>
           <a:xfrm>
-            <a:off x="2244436" y="4996874"/>
+            <a:off x="2346067" y="5805631"/>
             <a:ext cx="1985818" cy="692727"/>
           </a:xfrm>
           <a:prstGeom prst="rect">
@@ -3724,7 +3724,7 @@
         </p:nvSpPr>
         <p:spPr>
           <a:xfrm>
-            <a:off x="2590673" y="2503055"/>
+            <a:off x="3565173" y="2713182"/>
             <a:ext cx="1985818" cy="692727"/>
           </a:xfrm>
           <a:prstGeom prst="rect">
@@ -3759,6 +3759,253 @@
           </a:p>
         </p:txBody>
       </p:sp>
+      <p:cxnSp>
+        <p:nvCxnSpPr>
+          <p:cNvPr id="3" name="Straight Arrow Connector 2">
+            <a:extLst>
+              <a:ext uri="{FF2B5EF4-FFF2-40B4-BE49-F238E27FC236}">
+                <a16:creationId xmlns:a16="http://schemas.microsoft.com/office/drawing/2014/main" id="{DB6412AE-6BF8-4BCF-8D12-4AA3B9809C69}"/>
+              </a:ext>
+            </a:extLst>
+          </p:cNvPr>
+          <p:cNvCxnSpPr>
+            <a:cxnSpLocks/>
+          </p:cNvCxnSpPr>
+          <p:nvPr/>
+        </p:nvCxnSpPr>
+        <p:spPr>
+          <a:xfrm>
+            <a:off x="1306882" y="1814369"/>
+            <a:ext cx="152463" cy="875720"/>
+          </a:xfrm>
+          <a:prstGeom prst="straightConnector1">
+            <a:avLst/>
+          </a:prstGeom>
+          <a:ln>
+            <a:tailEnd type="triangle"/>
+          </a:ln>
+        </p:spPr>
+        <p:style>
+          <a:lnRef idx="1">
+            <a:schemeClr val="accent1"/>
+          </a:lnRef>
+          <a:fillRef idx="0">
+            <a:schemeClr val="accent1"/>
+          </a:fillRef>
+          <a:effectRef idx="0">
+            <a:schemeClr val="accent1"/>
+          </a:effectRef>
+          <a:fontRef idx="minor">
+            <a:schemeClr val="tx1"/>
+          </a:fontRef>
+        </p:style>
+      </p:cxnSp>
+      <p:cxnSp>
+        <p:nvCxnSpPr>
+          <p:cNvPr id="12" name="Straight Arrow Connector 11">
+            <a:extLst>
+              <a:ext uri="{FF2B5EF4-FFF2-40B4-BE49-F238E27FC236}">
+                <a16:creationId xmlns:a16="http://schemas.microsoft.com/office/drawing/2014/main" id="{6C4B5760-BF30-4AC3-A8F9-CE467DE311D0}"/>
+              </a:ext>
+            </a:extLst>
+          </p:cNvPr>
+          <p:cNvCxnSpPr>
+            <a:cxnSpLocks/>
+          </p:cNvCxnSpPr>
+          <p:nvPr/>
+        </p:nvCxnSpPr>
+        <p:spPr>
+          <a:xfrm>
+            <a:off x="1288409" y="1800513"/>
+            <a:ext cx="577336" cy="875723"/>
+          </a:xfrm>
+          <a:prstGeom prst="straightConnector1">
+            <a:avLst/>
+          </a:prstGeom>
+          <a:ln>
+            <a:tailEnd type="triangle"/>
+          </a:ln>
+        </p:spPr>
+        <p:style>
+          <a:lnRef idx="1">
+            <a:schemeClr val="accent1"/>
+          </a:lnRef>
+          <a:fillRef idx="0">
+            <a:schemeClr val="accent1"/>
+          </a:fillRef>
+          <a:effectRef idx="0">
+            <a:schemeClr val="accent1"/>
+          </a:effectRef>
+          <a:fontRef idx="minor">
+            <a:schemeClr val="tx1"/>
+          </a:fontRef>
+        </p:style>
+      </p:cxnSp>
+      <p:cxnSp>
+        <p:nvCxnSpPr>
+          <p:cNvPr id="16" name="Straight Arrow Connector 15">
+            <a:extLst>
+              <a:ext uri="{FF2B5EF4-FFF2-40B4-BE49-F238E27FC236}">
+                <a16:creationId xmlns:a16="http://schemas.microsoft.com/office/drawing/2014/main" id="{84793225-D832-441A-A9F5-EBCE094D9393}"/>
+              </a:ext>
+            </a:extLst>
+          </p:cNvPr>
+          <p:cNvCxnSpPr>
+            <a:cxnSpLocks/>
+            <a:stCxn id="5" idx="2"/>
+          </p:cNvCxnSpPr>
+          <p:nvPr/>
+        </p:nvCxnSpPr>
+        <p:spPr>
+          <a:xfrm>
+            <a:off x="1297709" y="1833417"/>
+            <a:ext cx="1117599" cy="849745"/>
+          </a:xfrm>
+          <a:prstGeom prst="straightConnector1">
+            <a:avLst/>
+          </a:prstGeom>
+          <a:ln>
+            <a:tailEnd type="triangle"/>
+          </a:ln>
+        </p:spPr>
+        <p:style>
+          <a:lnRef idx="1">
+            <a:schemeClr val="accent1"/>
+          </a:lnRef>
+          <a:fillRef idx="0">
+            <a:schemeClr val="accent1"/>
+          </a:fillRef>
+          <a:effectRef idx="0">
+            <a:schemeClr val="accent1"/>
+          </a:effectRef>
+          <a:fontRef idx="minor">
+            <a:schemeClr val="tx1"/>
+          </a:fontRef>
+        </p:style>
+      </p:cxnSp>
+      <p:cxnSp>
+        <p:nvCxnSpPr>
+          <p:cNvPr id="18" name="Straight Arrow Connector 17">
+            <a:extLst>
+              <a:ext uri="{FF2B5EF4-FFF2-40B4-BE49-F238E27FC236}">
+                <a16:creationId xmlns:a16="http://schemas.microsoft.com/office/drawing/2014/main" id="{076DB2BF-41D2-439F-B045-C15C3D89F9DD}"/>
+              </a:ext>
+            </a:extLst>
+          </p:cNvPr>
+          <p:cNvCxnSpPr>
+            <a:cxnSpLocks/>
+          </p:cNvCxnSpPr>
+          <p:nvPr/>
+        </p:nvCxnSpPr>
+        <p:spPr>
+          <a:xfrm>
+            <a:off x="3782258" y="1389496"/>
+            <a:ext cx="152463" cy="875720"/>
+          </a:xfrm>
+          <a:prstGeom prst="straightConnector1">
+            <a:avLst/>
+          </a:prstGeom>
+          <a:ln>
+            <a:tailEnd type="triangle"/>
+          </a:ln>
+        </p:spPr>
+        <p:style>
+          <a:lnRef idx="1">
+            <a:schemeClr val="accent1"/>
+          </a:lnRef>
+          <a:fillRef idx="0">
+            <a:schemeClr val="accent1"/>
+          </a:fillRef>
+          <a:effectRef idx="0">
+            <a:schemeClr val="accent1"/>
+          </a:effectRef>
+          <a:fontRef idx="minor">
+            <a:schemeClr val="tx1"/>
+          </a:fontRef>
+        </p:style>
+      </p:cxnSp>
+      <p:cxnSp>
+        <p:nvCxnSpPr>
+          <p:cNvPr id="19" name="Straight Arrow Connector 18">
+            <a:extLst>
+              <a:ext uri="{FF2B5EF4-FFF2-40B4-BE49-F238E27FC236}">
+                <a16:creationId xmlns:a16="http://schemas.microsoft.com/office/drawing/2014/main" id="{DCF9A45D-7ED1-41FC-93D9-6BE95DA7B8FE}"/>
+              </a:ext>
+            </a:extLst>
+          </p:cNvPr>
+          <p:cNvCxnSpPr>
+            <a:cxnSpLocks/>
+          </p:cNvCxnSpPr>
+          <p:nvPr/>
+        </p:nvCxnSpPr>
+        <p:spPr>
+          <a:xfrm>
+            <a:off x="3763785" y="1375640"/>
+            <a:ext cx="577336" cy="875723"/>
+          </a:xfrm>
+          <a:prstGeom prst="straightConnector1">
+            <a:avLst/>
+          </a:prstGeom>
+          <a:ln>
+            <a:tailEnd type="triangle"/>
+          </a:ln>
+        </p:spPr>
+        <p:style>
+          <a:lnRef idx="1">
+            <a:schemeClr val="accent1"/>
+          </a:lnRef>
+          <a:fillRef idx="0">
+            <a:schemeClr val="accent1"/>
+          </a:fillRef>
+          <a:effectRef idx="0">
+            <a:schemeClr val="accent1"/>
+          </a:effectRef>
+          <a:fontRef idx="minor">
+            <a:schemeClr val="tx1"/>
+          </a:fontRef>
+        </p:style>
+      </p:cxnSp>
+      <p:cxnSp>
+        <p:nvCxnSpPr>
+          <p:cNvPr id="20" name="Straight Arrow Connector 19">
+            <a:extLst>
+              <a:ext uri="{FF2B5EF4-FFF2-40B4-BE49-F238E27FC236}">
+                <a16:creationId xmlns:a16="http://schemas.microsoft.com/office/drawing/2014/main" id="{91F09EA0-87A4-4C49-9A9C-8AC4E00ADC57}"/>
+              </a:ext>
+            </a:extLst>
+          </p:cNvPr>
+          <p:cNvCxnSpPr>
+            <a:cxnSpLocks/>
+          </p:cNvCxnSpPr>
+          <p:nvPr/>
+        </p:nvCxnSpPr>
+        <p:spPr>
+          <a:xfrm>
+            <a:off x="3773085" y="1408544"/>
+            <a:ext cx="1117599" cy="849745"/>
+          </a:xfrm>
+          <a:prstGeom prst="straightConnector1">
+            <a:avLst/>
+          </a:prstGeom>
+          <a:ln>
+            <a:tailEnd type="triangle"/>
+          </a:ln>
+        </p:spPr>
+        <p:style>
+          <a:lnRef idx="1">
+            <a:schemeClr val="accent1"/>
+          </a:lnRef>
+          <a:fillRef idx="0">
+            <a:schemeClr val="accent1"/>
+          </a:fillRef>
+          <a:effectRef idx="0">
+            <a:schemeClr val="accent1"/>
+          </a:effectRef>
+          <a:fontRef idx="minor">
+            <a:schemeClr val="tx1"/>
+          </a:fontRef>
+        </p:style>
+      </p:cxnSp>
     </p:spTree>
     <p:extLst>
       <p:ext uri="{BB962C8B-B14F-4D97-AF65-F5344CB8AC3E}">
@@ -4062,7 +4309,7 @@
           <a:p>
             <a:r>
               <a:rPr lang="en-US" dirty="0"/>
-              <a:t>General Playlist Design Consideration</a:t>
+              <a:t>General Track Design Consideration</a:t>
             </a:r>
           </a:p>
           <a:p>
@@ -4075,7 +4322,7 @@
             </a:pPr>
             <a:r>
               <a:rPr lang="en-US" dirty="0"/>
-              <a:t>Playlists correspond to at most ONE online version</a:t>
+              <a:t>Tracks where its upload</a:t>
             </a:r>
           </a:p>
           <a:p>
@@ -4085,7 +4332,7 @@
             </a:pPr>
             <a:r>
               <a:rPr lang="en-US" dirty="0"/>
-              <a:t>Playlists can be synced </a:t>
+              <a:t>Tracks what playlists point to it</a:t>
             </a:r>
           </a:p>
         </p:txBody>

</xml_diff>